<commit_message>
Start QTP draft 4
</commit_message>
<xml_diff>
--- a/_4 Validation/Level Calibration Analysis.pptx
+++ b/_4 Validation/Level Calibration Analysis.pptx
@@ -218,7 +218,7 @@
           <a:p>
             <a:fld id="{9B059E67-D686-45CA-B9F4-C64C354AF467}" type="datetimeFigureOut">
               <a:rPr lang="en-US" smtClean="0"/>
-              <a:t>5/20/2025</a:t>
+              <a:t>8/14/2025</a:t>
             </a:fld>
             <a:endParaRPr lang="en-US"/>
           </a:p>
@@ -1036,7 +1036,7 @@
             <a:fld id="{875A8442-1A62-49A9-9A81-4C62FA7E6364}" type="datetimeFigureOut">
               <a:rPr lang="en-US" smtClean="0"/>
               <a:pPr/>
-              <a:t>5/20/2025</a:t>
+              <a:t>8/14/2025</a:t>
             </a:fld>
             <a:r>
               <a:rPr lang="en-US" dirty="0"/>
@@ -1285,7 +1285,7 @@
           <a:p>
             <a:fld id="{875A8442-1A62-49A9-9A81-4C62FA7E6364}" type="datetimeFigureOut">
               <a:rPr lang="en-US" smtClean="0"/>
-              <a:t>5/20/2025</a:t>
+              <a:t>8/14/2025</a:t>
             </a:fld>
             <a:endParaRPr lang="en-US"/>
           </a:p>
@@ -1471,7 +1471,7 @@
           <a:p>
             <a:fld id="{875A8442-1A62-49A9-9A81-4C62FA7E6364}" type="datetimeFigureOut">
               <a:rPr lang="en-US" smtClean="0"/>
-              <a:t>5/20/2025</a:t>
+              <a:t>8/14/2025</a:t>
             </a:fld>
             <a:endParaRPr lang="en-US"/>
           </a:p>
@@ -1647,7 +1647,7 @@
           <a:p>
             <a:fld id="{875A8442-1A62-49A9-9A81-4C62FA7E6364}" type="datetimeFigureOut">
               <a:rPr lang="en-US" smtClean="0"/>
-              <a:t>5/20/2025</a:t>
+              <a:t>8/14/2025</a:t>
             </a:fld>
             <a:endParaRPr lang="en-US"/>
           </a:p>
@@ -1900,7 +1900,7 @@
           <a:p>
             <a:fld id="{875A8442-1A62-49A9-9A81-4C62FA7E6364}" type="datetimeFigureOut">
               <a:rPr lang="en-US" smtClean="0"/>
-              <a:t>5/20/2025</a:t>
+              <a:t>8/14/2025</a:t>
             </a:fld>
             <a:endParaRPr lang="en-US"/>
           </a:p>
@@ -2193,7 +2193,7 @@
           <a:p>
             <a:fld id="{875A8442-1A62-49A9-9A81-4C62FA7E6364}" type="datetimeFigureOut">
               <a:rPr lang="en-US" smtClean="0"/>
-              <a:t>5/20/2025</a:t>
+              <a:t>8/14/2025</a:t>
             </a:fld>
             <a:endParaRPr lang="en-US"/>
           </a:p>
@@ -2620,7 +2620,7 @@
           <a:p>
             <a:fld id="{875A8442-1A62-49A9-9A81-4C62FA7E6364}" type="datetimeFigureOut">
               <a:rPr lang="en-US" smtClean="0"/>
-              <a:t>5/20/2025</a:t>
+              <a:t>8/14/2025</a:t>
             </a:fld>
             <a:endParaRPr lang="en-US"/>
           </a:p>
@@ -2745,7 +2745,7 @@
           <a:p>
             <a:fld id="{875A8442-1A62-49A9-9A81-4C62FA7E6364}" type="datetimeFigureOut">
               <a:rPr lang="en-US" smtClean="0"/>
-              <a:t>5/20/2025</a:t>
+              <a:t>8/14/2025</a:t>
             </a:fld>
             <a:endParaRPr lang="en-US"/>
           </a:p>
@@ -2848,7 +2848,7 @@
           <a:p>
             <a:fld id="{875A8442-1A62-49A9-9A81-4C62FA7E6364}" type="datetimeFigureOut">
               <a:rPr lang="en-US" smtClean="0"/>
-              <a:t>5/20/2025</a:t>
+              <a:t>8/14/2025</a:t>
             </a:fld>
             <a:endParaRPr lang="en-US"/>
           </a:p>
@@ -3131,7 +3131,7 @@
           <a:p>
             <a:fld id="{875A8442-1A62-49A9-9A81-4C62FA7E6364}" type="datetimeFigureOut">
               <a:rPr lang="en-US" smtClean="0"/>
-              <a:t>5/20/2025</a:t>
+              <a:t>8/14/2025</a:t>
             </a:fld>
             <a:endParaRPr lang="en-US"/>
           </a:p>
@@ -3391,7 +3391,7 @@
           <a:p>
             <a:fld id="{875A8442-1A62-49A9-9A81-4C62FA7E6364}" type="datetimeFigureOut">
               <a:rPr lang="en-US" smtClean="0"/>
-              <a:t>5/20/2025</a:t>
+              <a:t>8/14/2025</a:t>
             </a:fld>
             <a:endParaRPr lang="en-US"/>
           </a:p>
@@ -3683,7 +3683,7 @@
             <a:fld id="{875A8442-1A62-49A9-9A81-4C62FA7E6364}" type="datetimeFigureOut">
               <a:rPr lang="en-US" smtClean="0"/>
               <a:pPr/>
-              <a:t>5/20/2025</a:t>
+              <a:t>8/14/2025</a:t>
             </a:fld>
             <a:r>
               <a:rPr lang="en-US" dirty="0"/>
@@ -4267,6 +4267,63 @@
           </a:prstGeom>
         </p:spPr>
       </p:pic>
+      <p:sp>
+        <p:nvSpPr>
+          <p:cNvPr id="5" name="Speech Bubble: Rectangle 4">
+            <a:extLst>
+              <a:ext uri="{FF2B5EF4-FFF2-40B4-BE49-F238E27FC236}">
+                <a16:creationId xmlns:a16="http://schemas.microsoft.com/office/drawing/2014/main" id="{240AEFF5-92E2-1D7D-ED01-B52032C45E2E}"/>
+              </a:ext>
+            </a:extLst>
+          </p:cNvPr>
+          <p:cNvSpPr/>
+          <p:nvPr/>
+        </p:nvSpPr>
+        <p:spPr>
+          <a:xfrm>
+            <a:off x="4076700" y="5791200"/>
+            <a:ext cx="1447140" cy="456215"/>
+          </a:xfrm>
+          <a:prstGeom prst="wedgeRectCallout">
+            <a:avLst>
+              <a:gd name="adj1" fmla="val -82980"/>
+              <a:gd name="adj2" fmla="val -36822"/>
+            </a:avLst>
+          </a:prstGeom>
+        </p:spPr>
+        <p:style>
+          <a:lnRef idx="2">
+            <a:schemeClr val="accent1"/>
+          </a:lnRef>
+          <a:fillRef idx="1">
+            <a:schemeClr val="lt1"/>
+          </a:fillRef>
+          <a:effectRef idx="0">
+            <a:schemeClr val="accent1"/>
+          </a:effectRef>
+          <a:fontRef idx="minor">
+            <a:schemeClr val="dk1"/>
+          </a:fontRef>
+        </p:style>
+        <p:txBody>
+          <a:bodyPr rtlCol="0" anchor="ctr"/>
+          <a:lstStyle/>
+          <a:p>
+            <a:pPr algn="ctr"/>
+            <a:r>
+              <a:rPr lang="en-US" sz="1600" dirty="0"/>
+              <a:t>Target TP </a:t>
+            </a:r>
+          </a:p>
+          <a:p>
+            <a:pPr algn="ctr"/>
+            <a:r>
+              <a:rPr lang="en-US" sz="1600" dirty="0"/>
+              <a:t>Margin</a:t>
+            </a:r>
+          </a:p>
+        </p:txBody>
+      </p:sp>
     </p:spTree>
     <p:extLst>
       <p:ext uri="{BB962C8B-B14F-4D97-AF65-F5344CB8AC3E}">

</xml_diff>